<commit_message>
Finish task1 started file for task2
</commit_message>
<xml_diff>
--- a/Presentation_work.pptx
+++ b/Presentation_work.pptx
@@ -6,8 +6,12 @@
   </p:sldMasterIdLst>
   <p:sldIdLst>
     <p:sldId id="256" r:id="rId2"/>
-    <p:sldId id="257" r:id="rId3"/>
-    <p:sldId id="258" r:id="rId4"/>
+    <p:sldId id="259" r:id="rId3"/>
+    <p:sldId id="260" r:id="rId4"/>
+    <p:sldId id="257" r:id="rId5"/>
+    <p:sldId id="262" r:id="rId6"/>
+    <p:sldId id="261" r:id="rId7"/>
+    <p:sldId id="258" r:id="rId8"/>
   </p:sldIdLst>
   <p:sldSz cx="12192000" cy="6858000"/>
   <p:notesSz cx="6858000" cy="9144000"/>
@@ -106,6 +110,11 @@
       </a:defRPr>
     </a:lvl9pPr>
   </p:defaultTextStyle>
+  <p:extLst>
+    <p:ext uri="{EFAFB233-063F-42B5-8137-9DF3F51BA10A}">
+      <p15:sldGuideLst xmlns:p15="http://schemas.microsoft.com/office/powerpoint/2012/main"/>
+    </p:ext>
+  </p:extLst>
 </p:presentation>
 </file>
 
@@ -424,7 +433,7 @@
             <a:fld id="{73C3BD54-29B9-3D42-B178-776ED395AA85}" type="datetimeFigureOut">
               <a:rPr lang="en-US" smtClean="0"/>
               <a:pPr/>
-              <a:t>7/4/24</a:t>
+              <a:t>7/6/24</a:t>
             </a:fld>
             <a:endParaRPr lang="en-US" sz="1400"/>
           </a:p>
@@ -674,7 +683,7 @@
           <a:p>
             <a:fld id="{73C3BD54-29B9-3D42-B178-776ED395AA85}" type="datetimeFigureOut">
               <a:rPr lang="en-US" smtClean="0"/>
-              <a:t>7/4/24</a:t>
+              <a:t>7/6/24</a:t>
             </a:fld>
             <a:endParaRPr lang="en-US"/>
           </a:p>
@@ -988,7 +997,7 @@
           <a:p>
             <a:fld id="{73C3BD54-29B9-3D42-B178-776ED395AA85}" type="datetimeFigureOut">
               <a:rPr lang="en-US" smtClean="0"/>
-              <a:t>7/4/24</a:t>
+              <a:t>7/6/24</a:t>
             </a:fld>
             <a:endParaRPr lang="en-US"/>
           </a:p>
@@ -1502,7 +1511,7 @@
           <a:p>
             <a:fld id="{73C3BD54-29B9-3D42-B178-776ED395AA85}" type="datetimeFigureOut">
               <a:rPr lang="en-US" smtClean="0"/>
-              <a:t>7/4/24</a:t>
+              <a:t>7/6/24</a:t>
             </a:fld>
             <a:endParaRPr lang="en-US"/>
           </a:p>
@@ -1933,7 +1942,7 @@
           <a:p>
             <a:fld id="{73C3BD54-29B9-3D42-B178-776ED395AA85}" type="datetimeFigureOut">
               <a:rPr lang="en-US" smtClean="0"/>
-              <a:t>7/4/24</a:t>
+              <a:t>7/6/24</a:t>
             </a:fld>
             <a:endParaRPr lang="en-US"/>
           </a:p>
@@ -2198,7 +2207,7 @@
           <a:p>
             <a:fld id="{73C3BD54-29B9-3D42-B178-776ED395AA85}" type="datetimeFigureOut">
               <a:rPr lang="en-US" smtClean="0"/>
-              <a:t>7/4/24</a:t>
+              <a:t>7/6/24</a:t>
             </a:fld>
             <a:endParaRPr lang="en-US"/>
           </a:p>
@@ -2772,7 +2781,7 @@
           <a:p>
             <a:fld id="{73C3BD54-29B9-3D42-B178-776ED395AA85}" type="datetimeFigureOut">
               <a:rPr lang="en-US" smtClean="0"/>
-              <a:t>7/4/24</a:t>
+              <a:t>7/6/24</a:t>
             </a:fld>
             <a:endParaRPr lang="en-US"/>
           </a:p>
@@ -3075,7 +3084,7 @@
           <a:p>
             <a:fld id="{73C3BD54-29B9-3D42-B178-776ED395AA85}" type="datetimeFigureOut">
               <a:rPr lang="en-US" smtClean="0"/>
-              <a:t>7/4/24</a:t>
+              <a:t>7/6/24</a:t>
             </a:fld>
             <a:endParaRPr lang="en-US"/>
           </a:p>
@@ -3350,7 +3359,7 @@
           <a:p>
             <a:fld id="{73C3BD54-29B9-3D42-B178-776ED395AA85}" type="datetimeFigureOut">
               <a:rPr lang="en-US" smtClean="0"/>
-              <a:t>7/4/24</a:t>
+              <a:t>7/6/24</a:t>
             </a:fld>
             <a:endParaRPr lang="en-US"/>
           </a:p>
@@ -3821,7 +3830,7 @@
           <a:p>
             <a:fld id="{73C3BD54-29B9-3D42-B178-776ED395AA85}" type="datetimeFigureOut">
               <a:rPr lang="en-US" smtClean="0"/>
-              <a:t>7/4/24</a:t>
+              <a:t>7/6/24</a:t>
             </a:fld>
             <a:endParaRPr lang="en-US"/>
           </a:p>
@@ -4272,7 +4281,7 @@
           <a:p>
             <a:fld id="{73C3BD54-29B9-3D42-B178-776ED395AA85}" type="datetimeFigureOut">
               <a:rPr lang="en-US" smtClean="0"/>
-              <a:t>7/4/24</a:t>
+              <a:t>7/6/24</a:t>
             </a:fld>
             <a:endParaRPr lang="en-US"/>
           </a:p>
@@ -4668,7 +4677,7 @@
             <a:fld id="{73C3BD54-29B9-3D42-B178-776ED395AA85}" type="datetimeFigureOut">
               <a:rPr lang="en-US" smtClean="0"/>
               <a:pPr/>
-              <a:t>7/4/24</a:t>
+              <a:t>7/6/24</a:t>
             </a:fld>
             <a:endParaRPr lang="en-US" dirty="0"/>
           </a:p>
@@ -5353,7 +5362,7 @@
         </p:blipFill>
         <p:spPr>
           <a:xfrm>
-            <a:off x="20" y="18661"/>
+            <a:off x="20" y="-3373"/>
             <a:ext cx="12191980" cy="6857990"/>
           </a:xfrm>
           <a:prstGeom prst="rect">
@@ -5375,8 +5384,8 @@
         </p:nvSpPr>
         <p:spPr>
           <a:xfrm>
-            <a:off x="263564" y="171301"/>
-            <a:ext cx="3456282" cy="377090"/>
+            <a:off x="641364" y="296509"/>
+            <a:ext cx="3456282" cy="1200329"/>
           </a:xfrm>
           <a:prstGeom prst="rect">
             <a:avLst/>
@@ -5390,8 +5399,8 @@
           <a:lstStyle/>
           <a:p>
             <a:r>
-              <a:rPr lang="en-GB" dirty="0"/>
-              <a:t>Programmatic advertising</a:t>
+              <a:rPr lang="en-GB" sz="2400" b="1" u="sng" dirty="0"/>
+              <a:t>Programmatic advertising data collection process</a:t>
             </a:r>
           </a:p>
         </p:txBody>
@@ -5665,7 +5674,7 @@
             <p:spPr>
               <a:xfrm>
                 <a:off x="3463492" y="4790573"/>
-                <a:ext cx="2409762" cy="923330"/>
+                <a:ext cx="2409762" cy="646331"/>
               </a:xfrm>
               <a:prstGeom prst="rect">
                 <a:avLst/>
@@ -5689,13 +5698,6 @@
                 <a:r>
                   <a:rPr lang="en-GB" dirty="0"/>
                   <a:t>DSP</a:t>
-                </a:r>
-              </a:p>
-              <a:p>
-                <a:pPr algn="ctr"/>
-                <a:r>
-                  <a:rPr lang="en-GB" dirty="0"/>
-                  <a:t>(client)</a:t>
                 </a:r>
               </a:p>
             </p:txBody>
@@ -5801,7 +5803,7 @@
         </p:blipFill>
         <p:spPr>
           <a:xfrm>
-            <a:off x="6601178" y="4474105"/>
+            <a:off x="6723210" y="4498819"/>
             <a:ext cx="1363973" cy="999060"/>
           </a:xfrm>
           <a:prstGeom prst="rect">
@@ -5823,8 +5825,8 @@
         </p:nvSpPr>
         <p:spPr>
           <a:xfrm>
-            <a:off x="6534789" y="5435843"/>
-            <a:ext cx="2051844" cy="646331"/>
+            <a:off x="6693138" y="5508798"/>
+            <a:ext cx="1368901" cy="369332"/>
           </a:xfrm>
           <a:prstGeom prst="rect">
             <a:avLst/>
@@ -5841,17 +5843,6 @@
               <a:rPr lang="en-GB" dirty="0"/>
               <a:t>Impressions</a:t>
             </a:r>
-          </a:p>
-          <a:p>
-            <a:r>
-              <a:rPr lang="en-GB" dirty="0"/>
-              <a:t>Key: </a:t>
-            </a:r>
-            <a:r>
-              <a:rPr lang="en-GB" dirty="0" err="1"/>
-              <a:t>impression_id</a:t>
-            </a:r>
-            <a:endParaRPr lang="en-GB" dirty="0"/>
           </a:p>
         </p:txBody>
       </p:sp>
@@ -5872,7 +5863,7 @@
         </p:nvCxnSpPr>
         <p:spPr>
           <a:xfrm flipH="1">
-            <a:off x="7283165" y="2612182"/>
+            <a:off x="7405197" y="2636896"/>
             <a:ext cx="864184" cy="1861923"/>
           </a:xfrm>
           <a:prstGeom prst="straightConnector1">
@@ -6072,8 +6063,8 @@
         </p:nvSpPr>
         <p:spPr>
           <a:xfrm>
-            <a:off x="4407788" y="5434872"/>
-            <a:ext cx="1714124" cy="1200329"/>
+            <a:off x="4368803" y="5558203"/>
+            <a:ext cx="756426" cy="369332"/>
           </a:xfrm>
           <a:prstGeom prst="rect">
             <a:avLst/>
@@ -6090,29 +6081,6 @@
               <a:rPr lang="en-GB" dirty="0"/>
               <a:t>Clicks</a:t>
             </a:r>
-          </a:p>
-          <a:p>
-            <a:r>
-              <a:rPr lang="en-GB" dirty="0"/>
-              <a:t>Composite key:</a:t>
-            </a:r>
-          </a:p>
-          <a:p>
-            <a:r>
-              <a:rPr lang="en-GB" dirty="0" err="1"/>
-              <a:t>impression_id</a:t>
-            </a:r>
-            <a:r>
-              <a:rPr lang="en-GB" dirty="0"/>
-              <a:t>, </a:t>
-            </a:r>
-          </a:p>
-          <a:p>
-            <a:r>
-              <a:rPr lang="en-GB" dirty="0" err="1"/>
-              <a:t>user_id</a:t>
-            </a:r>
-            <a:endParaRPr lang="en-GB" dirty="0"/>
           </a:p>
         </p:txBody>
       </p:sp>
@@ -6358,7 +6326,7 @@
         </p:blipFill>
         <p:spPr>
           <a:xfrm>
-            <a:off x="1847894" y="4547778"/>
+            <a:off x="1847894" y="4523064"/>
             <a:ext cx="1363973" cy="999060"/>
           </a:xfrm>
           <a:prstGeom prst="rect">
@@ -6383,7 +6351,7 @@
         </p:nvCxnSpPr>
         <p:spPr>
           <a:xfrm flipH="1">
-            <a:off x="2529881" y="3428995"/>
+            <a:off x="2529881" y="3404281"/>
             <a:ext cx="134144" cy="1118783"/>
           </a:xfrm>
           <a:prstGeom prst="straightConnector1">
@@ -6426,8 +6394,8 @@
         </p:nvSpPr>
         <p:spPr>
           <a:xfrm>
-            <a:off x="1808272" y="5507554"/>
-            <a:ext cx="2028697" cy="646331"/>
+            <a:off x="1774607" y="5558203"/>
+            <a:ext cx="1367618" cy="369332"/>
           </a:xfrm>
           <a:prstGeom prst="rect">
             <a:avLst/>
@@ -6445,72 +6413,102 @@
               <a:t>Conversions</a:t>
             </a:r>
           </a:p>
-          <a:p>
-            <a:r>
-              <a:rPr lang="en-GB" dirty="0"/>
-              <a:t>Key: </a:t>
-            </a:r>
-            <a:r>
-              <a:rPr lang="en-GB" dirty="0" err="1"/>
-              <a:t>conversion_id</a:t>
-            </a:r>
-            <a:endParaRPr lang="en-GB" dirty="0"/>
-          </a:p>
-        </p:txBody>
-      </p:sp>
-      <p:sp>
-        <p:nvSpPr>
-          <p:cNvPr id="63" name="TextBox 62">
-            <a:extLst>
-              <a:ext uri="{FF2B5EF4-FFF2-40B4-BE49-F238E27FC236}">
-                <a16:creationId xmlns:a16="http://schemas.microsoft.com/office/drawing/2014/main" id="{19243D50-369B-8475-BCC3-208905D26FC7}"/>
-              </a:ext>
-            </a:extLst>
-          </p:cNvPr>
-          <p:cNvSpPr txBox="1"/>
+        </p:txBody>
+      </p:sp>
+      <p:cxnSp>
+        <p:nvCxnSpPr>
+          <p:cNvPr id="3" name="Straight Arrow Connector 2">
+            <a:extLst>
+              <a:ext uri="{FF2B5EF4-FFF2-40B4-BE49-F238E27FC236}">
+                <a16:creationId xmlns:a16="http://schemas.microsoft.com/office/drawing/2014/main" id="{24C683A6-F490-60CF-8CDE-940D02678526}"/>
+              </a:ext>
+            </a:extLst>
+          </p:cNvPr>
+          <p:cNvCxnSpPr>
+            <a:cxnSpLocks/>
+            <a:stCxn id="36" idx="1"/>
+            <a:endCxn id="46" idx="3"/>
+          </p:cNvCxnSpPr>
           <p:nvPr/>
-        </p:nvSpPr>
-        <p:spPr>
-          <a:xfrm>
-            <a:off x="246040" y="4475094"/>
-            <a:ext cx="1266629" cy="1200329"/>
-          </a:xfrm>
-          <a:prstGeom prst="rect">
+        </p:nvCxnSpPr>
+        <p:spPr>
+          <a:xfrm flipH="1">
+            <a:off x="5807216" y="4998349"/>
+            <a:ext cx="915994" cy="11637"/>
+          </a:xfrm>
+          <a:prstGeom prst="straightConnector1">
             <a:avLst/>
           </a:prstGeom>
-          <a:noFill/>
-        </p:spPr>
-        <p:txBody>
-          <a:bodyPr wrap="none" rtlCol="0">
-            <a:spAutoFit/>
-          </a:bodyPr>
-          <a:lstStyle/>
-          <a:p>
-            <a:r>
-              <a:rPr lang="en-GB" dirty="0"/>
-              <a:t>For each </a:t>
-            </a:r>
-          </a:p>
-          <a:p>
-            <a:r>
-              <a:rPr lang="en-GB" dirty="0"/>
-              <a:t>Conversion</a:t>
-            </a:r>
-          </a:p>
-          <a:p>
-            <a:r>
-              <a:rPr lang="en-GB" dirty="0"/>
-              <a:t>At least 1 </a:t>
-            </a:r>
-          </a:p>
-          <a:p>
-            <a:r>
-              <a:rPr lang="en-GB" dirty="0"/>
-              <a:t>impression</a:t>
-            </a:r>
-          </a:p>
-        </p:txBody>
-      </p:sp>
+          <a:ln>
+            <a:solidFill>
+              <a:schemeClr val="tx1"/>
+            </a:solidFill>
+            <a:prstDash val="dash"/>
+            <a:tailEnd type="triangle"/>
+          </a:ln>
+        </p:spPr>
+        <p:style>
+          <a:lnRef idx="1">
+            <a:schemeClr val="accent1"/>
+          </a:lnRef>
+          <a:fillRef idx="0">
+            <a:schemeClr val="accent1"/>
+          </a:fillRef>
+          <a:effectRef idx="0">
+            <a:schemeClr val="accent1"/>
+          </a:effectRef>
+          <a:fontRef idx="minor">
+            <a:schemeClr val="tx1"/>
+          </a:fontRef>
+        </p:style>
+      </p:cxnSp>
+      <p:cxnSp>
+        <p:nvCxnSpPr>
+          <p:cNvPr id="15" name="Straight Arrow Connector 14">
+            <a:extLst>
+              <a:ext uri="{FF2B5EF4-FFF2-40B4-BE49-F238E27FC236}">
+                <a16:creationId xmlns:a16="http://schemas.microsoft.com/office/drawing/2014/main" id="{AD8E4655-B223-166C-EAB0-869BC9D5B049}"/>
+              </a:ext>
+            </a:extLst>
+          </p:cNvPr>
+          <p:cNvCxnSpPr>
+            <a:cxnSpLocks/>
+            <a:stCxn id="46" idx="1"/>
+            <a:endCxn id="57" idx="3"/>
+          </p:cNvCxnSpPr>
+          <p:nvPr/>
+        </p:nvCxnSpPr>
+        <p:spPr>
+          <a:xfrm flipH="1">
+            <a:off x="3211867" y="5009986"/>
+            <a:ext cx="1231376" cy="12608"/>
+          </a:xfrm>
+          <a:prstGeom prst="straightConnector1">
+            <a:avLst/>
+          </a:prstGeom>
+          <a:ln>
+            <a:solidFill>
+              <a:schemeClr val="tx1"/>
+            </a:solidFill>
+            <a:prstDash val="dash"/>
+            <a:tailEnd type="triangle"/>
+          </a:ln>
+        </p:spPr>
+        <p:style>
+          <a:lnRef idx="1">
+            <a:schemeClr val="accent1"/>
+          </a:lnRef>
+          <a:fillRef idx="0">
+            <a:schemeClr val="accent1"/>
+          </a:fillRef>
+          <a:effectRef idx="0">
+            <a:schemeClr val="accent1"/>
+          </a:effectRef>
+          <a:fontRef idx="minor">
+            <a:schemeClr val="tx1"/>
+          </a:fontRef>
+        </p:style>
+      </p:cxnSp>
     </p:spTree>
     <p:extLst>
       <p:ext uri="{BB962C8B-B14F-4D97-AF65-F5344CB8AC3E}">
@@ -6527,6 +6525,40 @@
 <file path=ppt/slides/slide2.xml><?xml version="1.0" encoding="utf-8"?>
 <p:sld xmlns:a="http://schemas.openxmlformats.org/drawingml/2006/main" xmlns:r="http://schemas.openxmlformats.org/officeDocument/2006/relationships" xmlns:p="http://schemas.openxmlformats.org/presentationml/2006/main" showMasterSp="0">
   <p:cSld>
+    <p:bg>
+      <p:bgPr>
+        <a:gradFill>
+          <a:gsLst>
+            <a:gs pos="0">
+              <a:schemeClr val="accent1">
+                <a:lumMod val="5000"/>
+                <a:lumOff val="95000"/>
+              </a:schemeClr>
+            </a:gs>
+            <a:gs pos="74000">
+              <a:schemeClr val="accent1">
+                <a:lumMod val="45000"/>
+                <a:lumOff val="55000"/>
+              </a:schemeClr>
+            </a:gs>
+            <a:gs pos="83000">
+              <a:schemeClr val="accent1">
+                <a:lumMod val="45000"/>
+                <a:lumOff val="55000"/>
+              </a:schemeClr>
+            </a:gs>
+            <a:gs pos="100000">
+              <a:schemeClr val="accent1">
+                <a:lumMod val="30000"/>
+                <a:lumOff val="70000"/>
+              </a:schemeClr>
+            </a:gs>
+          </a:gsLst>
+          <a:lin ang="5400000" scaled="1"/>
+        </a:gradFill>
+        <a:effectLst/>
+      </p:bgPr>
+    </p:bg>
     <p:spTree>
       <p:nvGrpSpPr>
         <p:cNvPr id="1" name=""/>
@@ -6543,6 +6575,293 @@
       </p:grpSpPr>
       <p:sp>
         <p:nvSpPr>
+          <p:cNvPr id="2" name="Title 1">
+            <a:extLst>
+              <a:ext uri="{FF2B5EF4-FFF2-40B4-BE49-F238E27FC236}">
+                <a16:creationId xmlns:a16="http://schemas.microsoft.com/office/drawing/2014/main" id="{18325A10-9E6A-A741-1F28-68A9B0517DF1}"/>
+              </a:ext>
+            </a:extLst>
+          </p:cNvPr>
+          <p:cNvSpPr>
+            <a:spLocks noGrp="1"/>
+          </p:cNvSpPr>
+          <p:nvPr>
+            <p:ph type="title"/>
+          </p:nvPr>
+        </p:nvSpPr>
+        <p:spPr/>
+        <p:txBody>
+          <a:bodyPr/>
+          <a:lstStyle/>
+          <a:p>
+            <a:r>
+              <a:rPr lang="en-GB" dirty="0"/>
+              <a:t>Aim of the Analysis</a:t>
+            </a:r>
+          </a:p>
+        </p:txBody>
+      </p:sp>
+      <p:sp>
+        <p:nvSpPr>
+          <p:cNvPr id="3" name="Content Placeholder 2">
+            <a:extLst>
+              <a:ext uri="{FF2B5EF4-FFF2-40B4-BE49-F238E27FC236}">
+                <a16:creationId xmlns:a16="http://schemas.microsoft.com/office/drawing/2014/main" id="{7205324C-11BB-35A3-C74F-BBA18EFD633D}"/>
+              </a:ext>
+            </a:extLst>
+          </p:cNvPr>
+          <p:cNvSpPr>
+            <a:spLocks noGrp="1"/>
+          </p:cNvSpPr>
+          <p:nvPr>
+            <p:ph idx="1"/>
+          </p:nvPr>
+        </p:nvSpPr>
+        <p:spPr/>
+        <p:txBody>
+          <a:bodyPr>
+            <a:normAutofit lnSpcReduction="10000"/>
+          </a:bodyPr>
+          <a:lstStyle/>
+          <a:p>
+            <a:r>
+              <a:rPr lang="en-GB" dirty="0"/>
+              <a:t>Gain insights that can help advertisers increase the effectiveness of their programmatic advertising campaigns.</a:t>
+            </a:r>
+          </a:p>
+          <a:p>
+            <a:r>
+              <a:rPr lang="en-GB" dirty="0"/>
+              <a:t>Through extracting key performance indicators such as:</a:t>
+            </a:r>
+          </a:p>
+          <a:p>
+            <a:pPr lvl="1"/>
+            <a:r>
+              <a:rPr lang="en-GB" dirty="0"/>
+              <a:t>CTR (click-through rate)</a:t>
+            </a:r>
+          </a:p>
+          <a:p>
+            <a:pPr lvl="1"/>
+            <a:r>
+              <a:rPr lang="en-GB" dirty="0"/>
+              <a:t>Imp </a:t>
+            </a:r>
+            <a:r>
+              <a:rPr lang="en-GB" dirty="0" err="1"/>
+              <a:t>Cvr</a:t>
+            </a:r>
+            <a:r>
+              <a:rPr lang="en-GB" dirty="0"/>
+              <a:t> (impression to conversion rate)</a:t>
+            </a:r>
+          </a:p>
+          <a:p>
+            <a:r>
+              <a:rPr lang="en-GB" dirty="0"/>
+              <a:t>Aggregated by:</a:t>
+            </a:r>
+          </a:p>
+          <a:p>
+            <a:pPr lvl="1"/>
+            <a:r>
+              <a:rPr lang="en-GB" dirty="0"/>
+              <a:t>Geographic region</a:t>
+            </a:r>
+          </a:p>
+          <a:p>
+            <a:pPr lvl="1"/>
+            <a:r>
+              <a:rPr lang="en-GB" dirty="0"/>
+              <a:t>etc</a:t>
+            </a:r>
+          </a:p>
+        </p:txBody>
+      </p:sp>
+    </p:spTree>
+    <p:extLst>
+      <p:ext uri="{BB962C8B-B14F-4D97-AF65-F5344CB8AC3E}">
+        <p14:creationId xmlns:p14="http://schemas.microsoft.com/office/powerpoint/2010/main" val="2387116096"/>
+      </p:ext>
+    </p:extLst>
+  </p:cSld>
+  <p:clrMapOvr>
+    <a:masterClrMapping/>
+  </p:clrMapOvr>
+</p:sld>
+</file>
+
+<file path=ppt/slides/slide3.xml><?xml version="1.0" encoding="utf-8"?>
+<p:sld xmlns:a="http://schemas.openxmlformats.org/drawingml/2006/main" xmlns:r="http://schemas.openxmlformats.org/officeDocument/2006/relationships" xmlns:p="http://schemas.openxmlformats.org/presentationml/2006/main" showMasterSp="0">
+  <p:cSld>
+    <p:bg>
+      <p:bgPr>
+        <a:gradFill>
+          <a:gsLst>
+            <a:gs pos="0">
+              <a:schemeClr val="accent1">
+                <a:lumMod val="5000"/>
+                <a:lumOff val="95000"/>
+              </a:schemeClr>
+            </a:gs>
+            <a:gs pos="74000">
+              <a:schemeClr val="accent1">
+                <a:lumMod val="45000"/>
+                <a:lumOff val="55000"/>
+              </a:schemeClr>
+            </a:gs>
+            <a:gs pos="83000">
+              <a:schemeClr val="accent1">
+                <a:lumMod val="45000"/>
+                <a:lumOff val="55000"/>
+              </a:schemeClr>
+            </a:gs>
+            <a:gs pos="100000">
+              <a:schemeClr val="accent1">
+                <a:lumMod val="30000"/>
+                <a:lumOff val="70000"/>
+              </a:schemeClr>
+            </a:gs>
+          </a:gsLst>
+          <a:lin ang="5400000" scaled="1"/>
+        </a:gradFill>
+        <a:effectLst/>
+      </p:bgPr>
+    </p:bg>
+    <p:spTree>
+      <p:nvGrpSpPr>
+        <p:cNvPr id="1" name=""/>
+        <p:cNvGrpSpPr/>
+        <p:nvPr/>
+      </p:nvGrpSpPr>
+      <p:grpSpPr>
+        <a:xfrm>
+          <a:off x="0" y="0"/>
+          <a:ext cx="0" cy="0"/>
+          <a:chOff x="0" y="0"/>
+          <a:chExt cx="0" cy="0"/>
+        </a:xfrm>
+      </p:grpSpPr>
+      <p:sp>
+        <p:nvSpPr>
+          <p:cNvPr id="2" name="Title 1">
+            <a:extLst>
+              <a:ext uri="{FF2B5EF4-FFF2-40B4-BE49-F238E27FC236}">
+                <a16:creationId xmlns:a16="http://schemas.microsoft.com/office/drawing/2014/main" id="{E711B6D7-F9D4-702C-CD8B-722662145FE6}"/>
+              </a:ext>
+            </a:extLst>
+          </p:cNvPr>
+          <p:cNvSpPr>
+            <a:spLocks noGrp="1"/>
+          </p:cNvSpPr>
+          <p:nvPr>
+            <p:ph type="title"/>
+          </p:nvPr>
+        </p:nvSpPr>
+        <p:spPr/>
+        <p:txBody>
+          <a:bodyPr/>
+          <a:lstStyle/>
+          <a:p>
+            <a:r>
+              <a:rPr lang="en-GB" dirty="0"/>
+              <a:t>Mock ad data characteristics</a:t>
+            </a:r>
+          </a:p>
+        </p:txBody>
+      </p:sp>
+      <p:sp>
+        <p:nvSpPr>
+          <p:cNvPr id="3" name="Content Placeholder 2">
+            <a:extLst>
+              <a:ext uri="{FF2B5EF4-FFF2-40B4-BE49-F238E27FC236}">
+                <a16:creationId xmlns:a16="http://schemas.microsoft.com/office/drawing/2014/main" id="{1F1B9D29-9E73-A5E4-F0D8-8608D0521CAB}"/>
+              </a:ext>
+            </a:extLst>
+          </p:cNvPr>
+          <p:cNvSpPr>
+            <a:spLocks noGrp="1"/>
+          </p:cNvSpPr>
+          <p:nvPr>
+            <p:ph idx="1"/>
+          </p:nvPr>
+        </p:nvSpPr>
+        <p:spPr/>
+        <p:txBody>
+          <a:bodyPr/>
+          <a:lstStyle/>
+          <a:p>
+            <a:endParaRPr lang="en-GB" dirty="0"/>
+          </a:p>
+        </p:txBody>
+      </p:sp>
+    </p:spTree>
+    <p:extLst>
+      <p:ext uri="{BB962C8B-B14F-4D97-AF65-F5344CB8AC3E}">
+        <p14:creationId xmlns:p14="http://schemas.microsoft.com/office/powerpoint/2010/main" val="2436919611"/>
+      </p:ext>
+    </p:extLst>
+  </p:cSld>
+  <p:clrMapOvr>
+    <a:masterClrMapping/>
+  </p:clrMapOvr>
+</p:sld>
+</file>
+
+<file path=ppt/slides/slide4.xml><?xml version="1.0" encoding="utf-8"?>
+<p:sld xmlns:a="http://schemas.openxmlformats.org/drawingml/2006/main" xmlns:r="http://schemas.openxmlformats.org/officeDocument/2006/relationships" xmlns:p="http://schemas.openxmlformats.org/presentationml/2006/main" showMasterSp="0">
+  <p:cSld>
+    <p:bg>
+      <p:bgPr>
+        <a:gradFill>
+          <a:gsLst>
+            <a:gs pos="0">
+              <a:schemeClr val="accent1">
+                <a:lumMod val="5000"/>
+                <a:lumOff val="95000"/>
+              </a:schemeClr>
+            </a:gs>
+            <a:gs pos="74000">
+              <a:schemeClr val="accent1">
+                <a:lumMod val="45000"/>
+                <a:lumOff val="55000"/>
+              </a:schemeClr>
+            </a:gs>
+            <a:gs pos="83000">
+              <a:schemeClr val="accent1">
+                <a:lumMod val="45000"/>
+                <a:lumOff val="55000"/>
+              </a:schemeClr>
+            </a:gs>
+            <a:gs pos="100000">
+              <a:schemeClr val="accent1">
+                <a:lumMod val="30000"/>
+                <a:lumOff val="70000"/>
+              </a:schemeClr>
+            </a:gs>
+          </a:gsLst>
+          <a:lin ang="5400000" scaled="1"/>
+        </a:gradFill>
+        <a:effectLst/>
+      </p:bgPr>
+    </p:bg>
+    <p:spTree>
+      <p:nvGrpSpPr>
+        <p:cNvPr id="1" name=""/>
+        <p:cNvGrpSpPr/>
+        <p:nvPr/>
+      </p:nvGrpSpPr>
+      <p:grpSpPr>
+        <a:xfrm>
+          <a:off x="0" y="0"/>
+          <a:ext cx="0" cy="0"/>
+          <a:chOff x="0" y="0"/>
+          <a:chExt cx="0" cy="0"/>
+        </a:xfrm>
+      </p:grpSpPr>
+      <p:sp>
+        <p:nvSpPr>
           <p:cNvPr id="5" name="TextBox 4">
             <a:extLst>
               <a:ext uri="{FF2B5EF4-FFF2-40B4-BE49-F238E27FC236}">
@@ -6555,13 +6874,18 @@
         </p:nvSpPr>
         <p:spPr>
           <a:xfrm>
-            <a:off x="375139" y="345556"/>
-            <a:ext cx="6096000" cy="3693319"/>
+            <a:off x="375139" y="911847"/>
+            <a:ext cx="6096000" cy="2862322"/>
           </a:xfrm>
           <a:prstGeom prst="rect">
             <a:avLst/>
           </a:prstGeom>
           <a:noFill/>
+          <a:ln>
+            <a:solidFill>
+              <a:schemeClr val="tx1"/>
+            </a:solidFill>
+          </a:ln>
         </p:spPr>
         <p:txBody>
           <a:bodyPr wrap="square">
@@ -6609,6 +6933,28 @@
           </a:p>
           <a:p>
             <a:r>
+              <a:rPr lang="en-GB" b="1" dirty="0" err="1">
+                <a:solidFill>
+                  <a:srgbClr val="000000"/>
+                </a:solidFill>
+                <a:effectLst/>
+                <a:latin typeface="Arial" panose="020B0604020202020204" pitchFamily="34" charset="0"/>
+              </a:rPr>
+              <a:t>impression_id</a:t>
+            </a:r>
+            <a:r>
+              <a:rPr lang="en-GB" b="1" dirty="0">
+                <a:solidFill>
+                  <a:srgbClr val="000000"/>
+                </a:solidFill>
+                <a:effectLst/>
+                <a:latin typeface="Arial" panose="020B0604020202020204" pitchFamily="34" charset="0"/>
+              </a:rPr>
+              <a:t>: string</a:t>
+            </a:r>
+          </a:p>
+          <a:p>
+            <a:r>
               <a:rPr lang="en-GB" dirty="0" err="1">
                 <a:solidFill>
                   <a:srgbClr val="000000"/>
@@ -6616,7 +6962,7 @@
                 <a:effectLst/>
                 <a:latin typeface="Arial" panose="020B0604020202020204" pitchFamily="34" charset="0"/>
               </a:rPr>
-              <a:t>impression_id</a:t>
+              <a:t>url_address</a:t>
             </a:r>
             <a:r>
               <a:rPr lang="en-GB" dirty="0">
@@ -6638,7 +6984,7 @@
                 <a:effectLst/>
                 <a:latin typeface="Arial" panose="020B0604020202020204" pitchFamily="34" charset="0"/>
               </a:rPr>
-              <a:t>url_address</a:t>
+              <a:t>user_id</a:t>
             </a:r>
             <a:r>
               <a:rPr lang="en-GB" dirty="0">
@@ -6653,6 +6999,292 @@
           </a:p>
           <a:p>
             <a:r>
+              <a:rPr lang="en-GB" b="1" dirty="0" err="1">
+                <a:solidFill>
+                  <a:srgbClr val="000000"/>
+                </a:solidFill>
+                <a:effectLst/>
+                <a:latin typeface="Arial" panose="020B0604020202020204" pitchFamily="34" charset="0"/>
+              </a:rPr>
+              <a:t>request_country</a:t>
+            </a:r>
+            <a:r>
+              <a:rPr lang="en-GB" dirty="0">
+                <a:solidFill>
+                  <a:srgbClr val="000000"/>
+                </a:solidFill>
+                <a:effectLst/>
+                <a:latin typeface="Arial" panose="020B0604020202020204" pitchFamily="34" charset="0"/>
+              </a:rPr>
+              <a:t>: string </a:t>
+            </a:r>
+            <a:r>
+              <a:rPr lang="en-GB" b="1" dirty="0">
+                <a:solidFill>
+                  <a:srgbClr val="000000"/>
+                </a:solidFill>
+                <a:effectLst/>
+                <a:latin typeface="Arial" panose="020B0604020202020204" pitchFamily="34" charset="0"/>
+              </a:rPr>
+              <a:t>(</a:t>
+            </a:r>
+            <a:r>
+              <a:rPr lang="en-GB" b="1" dirty="0">
+                <a:solidFill>
+                  <a:srgbClr val="000000"/>
+                </a:solidFill>
+                <a:latin typeface="Arial" panose="020B0604020202020204" pitchFamily="34" charset="0"/>
+              </a:rPr>
+              <a:t>“A</a:t>
+            </a:r>
+            <a:r>
+              <a:rPr lang="en-GB" b="1" dirty="0">
+                <a:solidFill>
+                  <a:srgbClr val="000000"/>
+                </a:solidFill>
+                <a:effectLst/>
+                <a:latin typeface="Arial" panose="020B0604020202020204" pitchFamily="34" charset="0"/>
+              </a:rPr>
+              <a:t>ustria</a:t>
+            </a:r>
+            <a:r>
+              <a:rPr lang="en-GB" b="1" dirty="0">
+                <a:solidFill>
+                  <a:srgbClr val="000000"/>
+                </a:solidFill>
+                <a:latin typeface="Arial" panose="020B0604020202020204" pitchFamily="34" charset="0"/>
+              </a:rPr>
+              <a:t>”</a:t>
+            </a:r>
+            <a:r>
+              <a:rPr lang="en-GB" b="1" dirty="0">
+                <a:solidFill>
+                  <a:srgbClr val="000000"/>
+                </a:solidFill>
+                <a:effectLst/>
+                <a:latin typeface="Arial" panose="020B0604020202020204" pitchFamily="34" charset="0"/>
+              </a:rPr>
+              <a:t>)</a:t>
+            </a:r>
+          </a:p>
+          <a:p>
+            <a:r>
+              <a:rPr lang="en-GB" dirty="0" err="1">
+                <a:solidFill>
+                  <a:srgbClr val="000000"/>
+                </a:solidFill>
+                <a:effectLst/>
+                <a:latin typeface="Arial" panose="020B0604020202020204" pitchFamily="34" charset="0"/>
+              </a:rPr>
+              <a:t>tracking_type</a:t>
+            </a:r>
+            <a:r>
+              <a:rPr lang="en-GB" dirty="0">
+                <a:solidFill>
+                  <a:srgbClr val="000000"/>
+                </a:solidFill>
+                <a:effectLst/>
+                <a:latin typeface="Arial" panose="020B0604020202020204" pitchFamily="34" charset="0"/>
+              </a:rPr>
+              <a:t>: </a:t>
+            </a:r>
+          </a:p>
+          <a:p>
+            <a:r>
+              <a:rPr lang="en-GB" dirty="0" err="1">
+                <a:solidFill>
+                  <a:srgbClr val="000000"/>
+                </a:solidFill>
+                <a:effectLst/>
+                <a:latin typeface="Arial" panose="020B0604020202020204" pitchFamily="34" charset="0"/>
+              </a:rPr>
+              <a:t>dynamic_display</a:t>
+            </a:r>
+            <a:r>
+              <a:rPr lang="en-GB" dirty="0">
+                <a:solidFill>
+                  <a:srgbClr val="000000"/>
+                </a:solidFill>
+                <a:effectLst/>
+                <a:latin typeface="Arial" panose="020B0604020202020204" pitchFamily="34" charset="0"/>
+              </a:rPr>
+              <a:t>: </a:t>
+            </a:r>
+            <a:r>
+              <a:rPr lang="en-GB" dirty="0" err="1">
+                <a:solidFill>
+                  <a:srgbClr val="000000"/>
+                </a:solidFill>
+                <a:effectLst/>
+                <a:latin typeface="Arial" panose="020B0604020202020204" pitchFamily="34" charset="0"/>
+              </a:rPr>
+              <a:t>boolean</a:t>
+            </a:r>
+            <a:r>
+              <a:rPr lang="en-GB" dirty="0">
+                <a:solidFill>
+                  <a:srgbClr val="000000"/>
+                </a:solidFill>
+                <a:effectLst/>
+                <a:latin typeface="Helvetica" pitchFamily="2" charset="0"/>
+              </a:rPr>
+              <a:t> </a:t>
+            </a:r>
+          </a:p>
+          <a:p>
+            <a:r>
+              <a:rPr lang="en-GB" dirty="0" err="1">
+                <a:solidFill>
+                  <a:srgbClr val="000000"/>
+                </a:solidFill>
+                <a:effectLst/>
+                <a:latin typeface="Arial" panose="020B0604020202020204" pitchFamily="34" charset="0"/>
+              </a:rPr>
+              <a:t>dynamic_display_variables</a:t>
+            </a:r>
+            <a:r>
+              <a:rPr lang="en-GB" dirty="0">
+                <a:solidFill>
+                  <a:srgbClr val="000000"/>
+                </a:solidFill>
+                <a:effectLst/>
+                <a:latin typeface="Arial" panose="020B0604020202020204" pitchFamily="34" charset="0"/>
+              </a:rPr>
+              <a:t>: string</a:t>
+            </a:r>
+            <a:r>
+              <a:rPr lang="en-GB" dirty="0">
+                <a:solidFill>
+                  <a:srgbClr val="000000"/>
+                </a:solidFill>
+                <a:effectLst/>
+                <a:latin typeface="Helvetica" pitchFamily="2" charset="0"/>
+              </a:rPr>
+              <a:t> </a:t>
+            </a:r>
+            <a:r>
+              <a:rPr lang="en-GB" dirty="0" err="1">
+                <a:solidFill>
+                  <a:srgbClr val="000000"/>
+                </a:solidFill>
+                <a:effectLst/>
+                <a:latin typeface="Arial" panose="020B0604020202020204" pitchFamily="34" charset="0"/>
+              </a:rPr>
+              <a:t>request_browser_name</a:t>
+            </a:r>
+            <a:r>
+              <a:rPr lang="en-GB" dirty="0">
+                <a:solidFill>
+                  <a:srgbClr val="000000"/>
+                </a:solidFill>
+                <a:effectLst/>
+                <a:latin typeface="Arial" panose="020B0604020202020204" pitchFamily="34" charset="0"/>
+              </a:rPr>
+              <a:t>: string</a:t>
+            </a:r>
+          </a:p>
+          <a:p>
+            <a:r>
+              <a:rPr lang="en-GB" dirty="0">
+                <a:solidFill>
+                  <a:srgbClr val="000000"/>
+                </a:solidFill>
+                <a:effectLst/>
+                <a:latin typeface="Arial" panose="020B0604020202020204" pitchFamily="34" charset="0"/>
+              </a:rPr>
+              <a:t>timestamp: date</a:t>
+            </a:r>
+          </a:p>
+        </p:txBody>
+      </p:sp>
+      <p:sp>
+        <p:nvSpPr>
+          <p:cNvPr id="7" name="TextBox 6">
+            <a:extLst>
+              <a:ext uri="{FF2B5EF4-FFF2-40B4-BE49-F238E27FC236}">
+                <a16:creationId xmlns:a16="http://schemas.microsoft.com/office/drawing/2014/main" id="{6DD80497-7164-B334-D88E-8A5F6D5488AD}"/>
+              </a:ext>
+            </a:extLst>
+          </p:cNvPr>
+          <p:cNvSpPr txBox="1"/>
+          <p:nvPr/>
+        </p:nvSpPr>
+        <p:spPr>
+          <a:xfrm>
+            <a:off x="375139" y="4153161"/>
+            <a:ext cx="6096000" cy="1754326"/>
+          </a:xfrm>
+          <a:prstGeom prst="rect">
+            <a:avLst/>
+          </a:prstGeom>
+          <a:noFill/>
+          <a:ln>
+            <a:solidFill>
+              <a:schemeClr val="tx1"/>
+            </a:solidFill>
+          </a:ln>
+        </p:spPr>
+        <p:txBody>
+          <a:bodyPr wrap="square">
+            <a:spAutoFit/>
+          </a:bodyPr>
+          <a:lstStyle/>
+          <a:p>
+            <a:r>
+              <a:rPr lang="en-GB" dirty="0">
+                <a:solidFill>
+                  <a:srgbClr val="000000"/>
+                </a:solidFill>
+                <a:effectLst/>
+                <a:latin typeface="Wingdings" pitchFamily="2" charset="2"/>
+              </a:rPr>
+              <a:t>⚫</a:t>
+            </a:r>
+            <a:r>
+              <a:rPr lang="en-GB" dirty="0">
+                <a:solidFill>
+                  <a:srgbClr val="000000"/>
+                </a:solidFill>
+                <a:effectLst/>
+                <a:latin typeface="Arial" panose="020B0604020202020204" pitchFamily="34" charset="0"/>
+              </a:rPr>
+              <a:t> </a:t>
+            </a:r>
+            <a:r>
+              <a:rPr lang="en-GB" b="1" dirty="0">
+                <a:solidFill>
+                  <a:srgbClr val="000000"/>
+                </a:solidFill>
+                <a:effectLst/>
+                <a:latin typeface="Arial" panose="020B0604020202020204" pitchFamily="34" charset="0"/>
+              </a:rPr>
+              <a:t>conversions</a:t>
+            </a:r>
+          </a:p>
+          <a:p>
+            <a:r>
+              <a:rPr lang="en-GB" b="1" dirty="0" err="1">
+                <a:solidFill>
+                  <a:srgbClr val="000000"/>
+                </a:solidFill>
+                <a:effectLst/>
+                <a:latin typeface="Arial" panose="020B0604020202020204" pitchFamily="34" charset="0"/>
+              </a:rPr>
+              <a:t>conversion_id</a:t>
+            </a:r>
+            <a:r>
+              <a:rPr lang="en-GB" b="1" dirty="0">
+                <a:solidFill>
+                  <a:srgbClr val="000000"/>
+                </a:solidFill>
+                <a:effectLst/>
+                <a:latin typeface="Arial" panose="020B0604020202020204" pitchFamily="34" charset="0"/>
+              </a:rPr>
+              <a:t>: string</a:t>
+            </a:r>
+          </a:p>
+          <a:p>
+            <a:r>
               <a:rPr lang="en-GB" dirty="0" err="1">
                 <a:solidFill>
                   <a:srgbClr val="000000"/>
@@ -6675,14 +7307,14 @@
           </a:p>
           <a:p>
             <a:r>
-              <a:rPr lang="en-GB" b="1" dirty="0" err="1">
+              <a:rPr lang="en-GB" dirty="0" err="1">
                 <a:solidFill>
                   <a:srgbClr val="000000"/>
                 </a:solidFill>
                 <a:effectLst/>
                 <a:latin typeface="Arial" panose="020B0604020202020204" pitchFamily="34" charset="0"/>
               </a:rPr>
-              <a:t>request_country</a:t>
+              <a:t>dval</a:t>
             </a:r>
             <a:r>
               <a:rPr lang="en-GB" dirty="0">
@@ -6692,55 +7324,17 @@
                 <a:effectLst/>
                 <a:latin typeface="Arial" panose="020B0604020202020204" pitchFamily="34" charset="0"/>
               </a:rPr>
-              <a:t>: string </a:t>
-            </a:r>
-            <a:r>
-              <a:rPr lang="en-GB" b="1" dirty="0">
+              <a:t>: integer</a:t>
+            </a:r>
+            <a:r>
+              <a:rPr lang="en-GB" dirty="0">
                 <a:solidFill>
                   <a:srgbClr val="000000"/>
                 </a:solidFill>
                 <a:effectLst/>
-                <a:latin typeface="Arial" panose="020B0604020202020204" pitchFamily="34" charset="0"/>
+                <a:latin typeface="Helvetica" pitchFamily="2" charset="0"/>
               </a:rPr>
-              <a:t>(</a:t>
-            </a:r>
-            <a:r>
-              <a:rPr lang="en-GB" b="1" dirty="0">
-                <a:solidFill>
-                  <a:srgbClr val="000000"/>
-                </a:solidFill>
-                <a:latin typeface="Arial" panose="020B0604020202020204" pitchFamily="34" charset="0"/>
-              </a:rPr>
-              <a:t>“A</a:t>
-            </a:r>
-            <a:r>
-              <a:rPr lang="en-GB" b="1" dirty="0">
-                <a:solidFill>
-                  <a:srgbClr val="000000"/>
-                </a:solidFill>
-                <a:effectLst/>
-                <a:latin typeface="Arial" panose="020B0604020202020204" pitchFamily="34" charset="0"/>
-              </a:rPr>
-              <a:t>ustria</a:t>
-            </a:r>
-            <a:r>
-              <a:rPr lang="en-GB" b="1" dirty="0">
-                <a:solidFill>
-                  <a:srgbClr val="000000"/>
-                </a:solidFill>
-                <a:latin typeface="Arial" panose="020B0604020202020204" pitchFamily="34" charset="0"/>
-              </a:rPr>
-              <a:t>”</a:t>
-            </a:r>
-            <a:r>
-              <a:rPr lang="en-GB" b="1" dirty="0">
-                <a:solidFill>
-                  <a:srgbClr val="000000"/>
-                </a:solidFill>
-                <a:effectLst/>
-                <a:latin typeface="Arial" panose="020B0604020202020204" pitchFamily="34" charset="0"/>
-              </a:rPr>
-              <a:t>)</a:t>
+              <a:t> </a:t>
             </a:r>
           </a:p>
           <a:p>
@@ -6752,7 +7346,7 @@
                 <a:effectLst/>
                 <a:latin typeface="Arial" panose="020B0604020202020204" pitchFamily="34" charset="0"/>
               </a:rPr>
-              <a:t>tracking_type</a:t>
+              <a:t>curr</a:t>
             </a:r>
             <a:r>
               <a:rPr lang="en-GB" dirty="0">
@@ -6774,152 +7368,6 @@
               </a:rPr>
               <a:t> </a:t>
             </a:r>
-            <a:r>
-              <a:rPr lang="en-GB" dirty="0">
-                <a:solidFill>
-                  <a:srgbClr val="000000"/>
-                </a:solidFill>
-                <a:effectLst/>
-                <a:latin typeface="Arial" panose="020B0604020202020204" pitchFamily="34" charset="0"/>
-              </a:rPr>
-              <a:t>[this is the tracking type (fingerprinted or cookie-based)]</a:t>
-            </a:r>
-          </a:p>
-          <a:p>
-            <a:r>
-              <a:rPr lang="en-GB" dirty="0" err="1">
-                <a:solidFill>
-                  <a:srgbClr val="000000"/>
-                </a:solidFill>
-                <a:effectLst/>
-                <a:latin typeface="Arial" panose="020B0604020202020204" pitchFamily="34" charset="0"/>
-              </a:rPr>
-              <a:t>dynamic_display</a:t>
-            </a:r>
-            <a:r>
-              <a:rPr lang="en-GB" dirty="0">
-                <a:solidFill>
-                  <a:srgbClr val="000000"/>
-                </a:solidFill>
-                <a:effectLst/>
-                <a:latin typeface="Arial" panose="020B0604020202020204" pitchFamily="34" charset="0"/>
-              </a:rPr>
-              <a:t>: </a:t>
-            </a:r>
-            <a:r>
-              <a:rPr lang="en-GB" dirty="0" err="1">
-                <a:solidFill>
-                  <a:srgbClr val="000000"/>
-                </a:solidFill>
-                <a:effectLst/>
-                <a:latin typeface="Arial" panose="020B0604020202020204" pitchFamily="34" charset="0"/>
-              </a:rPr>
-              <a:t>boolean</a:t>
-            </a:r>
-            <a:r>
-              <a:rPr lang="en-GB" dirty="0">
-                <a:solidFill>
-                  <a:srgbClr val="000000"/>
-                </a:solidFill>
-                <a:effectLst/>
-                <a:latin typeface="Helvetica" pitchFamily="2" charset="0"/>
-              </a:rPr>
-              <a:t> </a:t>
-            </a:r>
-            <a:r>
-              <a:rPr lang="en-GB" dirty="0">
-                <a:solidFill>
-                  <a:srgbClr val="000000"/>
-                </a:solidFill>
-                <a:effectLst/>
-                <a:latin typeface="Arial" panose="020B0604020202020204" pitchFamily="34" charset="0"/>
-              </a:rPr>
-              <a:t>[this is whether the impression was served through Dynamic Display]</a:t>
-            </a:r>
-          </a:p>
-          <a:p>
-            <a:r>
-              <a:rPr lang="en-GB" dirty="0" err="1">
-                <a:solidFill>
-                  <a:srgbClr val="000000"/>
-                </a:solidFill>
-                <a:effectLst/>
-                <a:latin typeface="Arial" panose="020B0604020202020204" pitchFamily="34" charset="0"/>
-              </a:rPr>
-              <a:t>dynamic_display_variables</a:t>
-            </a:r>
-            <a:r>
-              <a:rPr lang="en-GB" dirty="0">
-                <a:solidFill>
-                  <a:srgbClr val="000000"/>
-                </a:solidFill>
-                <a:effectLst/>
-                <a:latin typeface="Arial" panose="020B0604020202020204" pitchFamily="34" charset="0"/>
-              </a:rPr>
-              <a:t>: string</a:t>
-            </a:r>
-            <a:r>
-              <a:rPr lang="en-GB" dirty="0">
-                <a:solidFill>
-                  <a:srgbClr val="000000"/>
-                </a:solidFill>
-                <a:effectLst/>
-                <a:latin typeface="Helvetica" pitchFamily="2" charset="0"/>
-              </a:rPr>
-              <a:t> </a:t>
-            </a:r>
-            <a:r>
-              <a:rPr lang="en-GB" dirty="0">
-                <a:solidFill>
-                  <a:srgbClr val="000000"/>
-                </a:solidFill>
-                <a:effectLst/>
-                <a:latin typeface="Arial" panose="020B0604020202020204" pitchFamily="34" charset="0"/>
-              </a:rPr>
-              <a:t>[content served in the impression, </a:t>
-            </a:r>
-            <a:r>
-              <a:rPr lang="en-GB" dirty="0" err="1">
-                <a:solidFill>
-                  <a:srgbClr val="000000"/>
-                </a:solidFill>
-                <a:effectLst/>
-                <a:latin typeface="Arial" panose="020B0604020202020204" pitchFamily="34" charset="0"/>
-              </a:rPr>
-              <a:t>i.e</a:t>
-            </a:r>
-            <a:r>
-              <a:rPr lang="en-GB" dirty="0">
-                <a:solidFill>
-                  <a:srgbClr val="000000"/>
-                </a:solidFill>
-                <a:effectLst/>
-                <a:latin typeface="Arial" panose="020B0604020202020204" pitchFamily="34" charset="0"/>
-              </a:rPr>
-              <a:t> soccer vs baseball]</a:t>
-            </a:r>
-          </a:p>
-          <a:p>
-            <a:r>
-              <a:rPr lang="en-GB" dirty="0" err="1">
-                <a:solidFill>
-                  <a:srgbClr val="000000"/>
-                </a:solidFill>
-                <a:effectLst/>
-                <a:latin typeface="Arial" panose="020B0604020202020204" pitchFamily="34" charset="0"/>
-              </a:rPr>
-              <a:t>request_browser_name</a:t>
-            </a:r>
-            <a:r>
-              <a:rPr lang="en-GB" dirty="0">
-                <a:solidFill>
-                  <a:srgbClr val="000000"/>
-                </a:solidFill>
-                <a:effectLst/>
-                <a:latin typeface="Arial" panose="020B0604020202020204" pitchFamily="34" charset="0"/>
-              </a:rPr>
-              <a:t>: string</a:t>
-            </a:r>
           </a:p>
           <a:p>
             <a:r>
@@ -6937,10 +7385,10 @@
       </p:sp>
       <p:sp>
         <p:nvSpPr>
-          <p:cNvPr id="7" name="TextBox 6">
-            <a:extLst>
-              <a:ext uri="{FF2B5EF4-FFF2-40B4-BE49-F238E27FC236}">
-                <a16:creationId xmlns:a16="http://schemas.microsoft.com/office/drawing/2014/main" id="{6DD80497-7164-B334-D88E-8A5F6D5488AD}"/>
+          <p:cNvPr id="9" name="TextBox 8">
+            <a:extLst>
+              <a:ext uri="{FF2B5EF4-FFF2-40B4-BE49-F238E27FC236}">
+                <a16:creationId xmlns:a16="http://schemas.microsoft.com/office/drawing/2014/main" id="{C0225D80-30AE-353F-6727-72BB4F9596A9}"/>
               </a:ext>
             </a:extLst>
           </p:cNvPr>
@@ -6949,13 +7397,18 @@
         </p:nvSpPr>
         <p:spPr>
           <a:xfrm>
-            <a:off x="6025662" y="4220197"/>
-            <a:ext cx="6096000" cy="1477328"/>
+            <a:off x="6979349" y="911847"/>
+            <a:ext cx="4747213" cy="1200329"/>
           </a:xfrm>
           <a:prstGeom prst="rect">
             <a:avLst/>
           </a:prstGeom>
           <a:noFill/>
+          <a:ln>
+            <a:solidFill>
+              <a:schemeClr val="tx1"/>
+            </a:solidFill>
+          </a:ln>
         </p:spPr>
         <p:txBody>
           <a:bodyPr wrap="square">
@@ -6984,205 +7437,6 @@
               <a:t> </a:t>
             </a:r>
             <a:r>
-              <a:rPr lang="en-GB" b="1" dirty="0" err="1">
-                <a:solidFill>
-                  <a:srgbClr val="000000"/>
-                </a:solidFill>
-                <a:effectLst/>
-                <a:latin typeface="Arial" panose="020B0604020202020204" pitchFamily="34" charset="0"/>
-              </a:rPr>
-              <a:t>conversions</a:t>
-            </a:r>
-            <a:r>
-              <a:rPr lang="en-GB" dirty="0" err="1">
-                <a:solidFill>
-                  <a:srgbClr val="000000"/>
-                </a:solidFill>
-                <a:effectLst/>
-                <a:latin typeface="Arial" panose="020B0604020202020204" pitchFamily="34" charset="0"/>
-              </a:rPr>
-              <a:t>conversion_id</a:t>
-            </a:r>
-            <a:r>
-              <a:rPr lang="en-GB" dirty="0">
-                <a:solidFill>
-                  <a:srgbClr val="000000"/>
-                </a:solidFill>
-                <a:effectLst/>
-                <a:latin typeface="Arial" panose="020B0604020202020204" pitchFamily="34" charset="0"/>
-              </a:rPr>
-              <a:t>: string</a:t>
-            </a:r>
-          </a:p>
-          <a:p>
-            <a:r>
-              <a:rPr lang="en-GB" dirty="0" err="1">
-                <a:solidFill>
-                  <a:srgbClr val="000000"/>
-                </a:solidFill>
-                <a:effectLst/>
-                <a:latin typeface="Arial" panose="020B0604020202020204" pitchFamily="34" charset="0"/>
-              </a:rPr>
-              <a:t>user_id</a:t>
-            </a:r>
-            <a:r>
-              <a:rPr lang="en-GB" dirty="0">
-                <a:solidFill>
-                  <a:srgbClr val="000000"/>
-                </a:solidFill>
-                <a:effectLst/>
-                <a:latin typeface="Arial" panose="020B0604020202020204" pitchFamily="34" charset="0"/>
-              </a:rPr>
-              <a:t>: string</a:t>
-            </a:r>
-          </a:p>
-          <a:p>
-            <a:r>
-              <a:rPr lang="en-GB" dirty="0" err="1">
-                <a:solidFill>
-                  <a:srgbClr val="000000"/>
-                </a:solidFill>
-                <a:effectLst/>
-                <a:latin typeface="Arial" panose="020B0604020202020204" pitchFamily="34" charset="0"/>
-              </a:rPr>
-              <a:t>dval</a:t>
-            </a:r>
-            <a:r>
-              <a:rPr lang="en-GB" dirty="0">
-                <a:solidFill>
-                  <a:srgbClr val="000000"/>
-                </a:solidFill>
-                <a:effectLst/>
-                <a:latin typeface="Arial" panose="020B0604020202020204" pitchFamily="34" charset="0"/>
-              </a:rPr>
-              <a:t>: integer</a:t>
-            </a:r>
-            <a:r>
-              <a:rPr lang="en-GB" dirty="0">
-                <a:solidFill>
-                  <a:srgbClr val="000000"/>
-                </a:solidFill>
-                <a:effectLst/>
-                <a:latin typeface="Helvetica" pitchFamily="2" charset="0"/>
-              </a:rPr>
-              <a:t> </a:t>
-            </a:r>
-            <a:r>
-              <a:rPr lang="en-GB" dirty="0">
-                <a:solidFill>
-                  <a:srgbClr val="000000"/>
-                </a:solidFill>
-                <a:effectLst/>
-                <a:latin typeface="Arial" panose="020B0604020202020204" pitchFamily="34" charset="0"/>
-              </a:rPr>
-              <a:t>[this is the deposit value of the conversion]</a:t>
-            </a:r>
-          </a:p>
-          <a:p>
-            <a:r>
-              <a:rPr lang="en-GB" dirty="0" err="1">
-                <a:solidFill>
-                  <a:srgbClr val="000000"/>
-                </a:solidFill>
-                <a:effectLst/>
-                <a:latin typeface="Arial" panose="020B0604020202020204" pitchFamily="34" charset="0"/>
-              </a:rPr>
-              <a:t>curr</a:t>
-            </a:r>
-            <a:r>
-              <a:rPr lang="en-GB" dirty="0">
-                <a:solidFill>
-                  <a:srgbClr val="000000"/>
-                </a:solidFill>
-                <a:effectLst/>
-                <a:latin typeface="Arial" panose="020B0604020202020204" pitchFamily="34" charset="0"/>
-              </a:rPr>
-              <a:t>: string</a:t>
-            </a:r>
-            <a:r>
-              <a:rPr lang="en-GB" dirty="0">
-                <a:solidFill>
-                  <a:srgbClr val="000000"/>
-                </a:solidFill>
-                <a:effectLst/>
-                <a:latin typeface="Helvetica" pitchFamily="2" charset="0"/>
-              </a:rPr>
-              <a:t> </a:t>
-            </a:r>
-            <a:r>
-              <a:rPr lang="en-GB" dirty="0">
-                <a:solidFill>
-                  <a:srgbClr val="000000"/>
-                </a:solidFill>
-                <a:effectLst/>
-                <a:latin typeface="Arial" panose="020B0604020202020204" pitchFamily="34" charset="0"/>
-              </a:rPr>
-              <a:t>[this is the currency of the deposit value]</a:t>
-            </a:r>
-          </a:p>
-          <a:p>
-            <a:r>
-              <a:rPr lang="en-GB" dirty="0">
-                <a:solidFill>
-                  <a:srgbClr val="000000"/>
-                </a:solidFill>
-                <a:effectLst/>
-                <a:latin typeface="Arial" panose="020B0604020202020204" pitchFamily="34" charset="0"/>
-              </a:rPr>
-              <a:t>timestamp: date</a:t>
-            </a:r>
-          </a:p>
-        </p:txBody>
-      </p:sp>
-      <p:sp>
-        <p:nvSpPr>
-          <p:cNvPr id="9" name="TextBox 8">
-            <a:extLst>
-              <a:ext uri="{FF2B5EF4-FFF2-40B4-BE49-F238E27FC236}">
-                <a16:creationId xmlns:a16="http://schemas.microsoft.com/office/drawing/2014/main" id="{C0225D80-30AE-353F-6727-72BB4F9596A9}"/>
-              </a:ext>
-            </a:extLst>
-          </p:cNvPr>
-          <p:cNvSpPr txBox="1"/>
-          <p:nvPr/>
-        </p:nvSpPr>
-        <p:spPr>
-          <a:xfrm>
-            <a:off x="7197970" y="345556"/>
-            <a:ext cx="6096000" cy="1200329"/>
-          </a:xfrm>
-          <a:prstGeom prst="rect">
-            <a:avLst/>
-          </a:prstGeom>
-          <a:noFill/>
-        </p:spPr>
-        <p:txBody>
-          <a:bodyPr wrap="square">
-            <a:spAutoFit/>
-          </a:bodyPr>
-          <a:lstStyle/>
-          <a:p>
-            <a:r>
-              <a:rPr lang="en-GB" dirty="0">
-                <a:solidFill>
-                  <a:srgbClr val="000000"/>
-                </a:solidFill>
-                <a:effectLst/>
-                <a:latin typeface="Wingdings" pitchFamily="2" charset="2"/>
-              </a:rPr>
-              <a:t>⚫</a:t>
-            </a:r>
-            <a:r>
-              <a:rPr lang="en-GB" dirty="0">
-                <a:solidFill>
-                  <a:srgbClr val="000000"/>
-                </a:solidFill>
-                <a:effectLst/>
-                <a:latin typeface="Arial" panose="020B0604020202020204" pitchFamily="34" charset="0"/>
-              </a:rPr>
-              <a:t> </a:t>
-            </a:r>
-            <a:r>
               <a:rPr lang="en-GB" b="1" dirty="0">
                 <a:solidFill>
                   <a:srgbClr val="000000"/>
@@ -7202,58 +7456,143 @@
           </a:p>
           <a:p>
             <a:r>
-              <a:rPr lang="en-GB" dirty="0" err="1">
+              <a:rPr lang="en-GB" b="1" dirty="0" err="1">
+                <a:effectLst/>
+                <a:latin typeface="Arial" panose="020B0604020202020204" pitchFamily="34" charset="0"/>
+              </a:rPr>
+              <a:t>impression_id</a:t>
+            </a:r>
+            <a:r>
+              <a:rPr lang="en-GB" b="1" dirty="0">
+                <a:effectLst/>
+                <a:latin typeface="Arial" panose="020B0604020202020204" pitchFamily="34" charset="0"/>
+              </a:rPr>
+              <a:t>: </a:t>
+            </a:r>
+            <a:r>
+              <a:rPr lang="en-GB" b="1" dirty="0">
                 <a:solidFill>
-                  <a:srgbClr val="000000"/>
+                  <a:srgbClr val="0070C0"/>
                 </a:solidFill>
                 <a:effectLst/>
                 <a:latin typeface="Arial" panose="020B0604020202020204" pitchFamily="34" charset="0"/>
               </a:rPr>
-              <a:t>impression_id</a:t>
-            </a:r>
-            <a:r>
-              <a:rPr lang="en-GB" dirty="0">
+              <a:t>int</a:t>
+            </a:r>
+          </a:p>
+          <a:p>
+            <a:r>
+              <a:rPr lang="en-GB" b="1" dirty="0" err="1">
+                <a:effectLst/>
+                <a:latin typeface="Arial" panose="020B0604020202020204" pitchFamily="34" charset="0"/>
+              </a:rPr>
+              <a:t>user_id</a:t>
+            </a:r>
+            <a:r>
+              <a:rPr lang="en-GB" b="1" dirty="0">
+                <a:effectLst/>
+                <a:latin typeface="Arial" panose="020B0604020202020204" pitchFamily="34" charset="0"/>
+              </a:rPr>
+              <a:t>: </a:t>
+            </a:r>
+            <a:r>
+              <a:rPr lang="en-GB" b="1" dirty="0">
                 <a:solidFill>
-                  <a:srgbClr val="000000"/>
+                  <a:srgbClr val="0070C0"/>
                 </a:solidFill>
                 <a:effectLst/>
                 <a:latin typeface="Arial" panose="020B0604020202020204" pitchFamily="34" charset="0"/>
               </a:rPr>
-              <a:t>: int</a:t>
-            </a:r>
-          </a:p>
-          <a:p>
-            <a:r>
-              <a:rPr lang="en-GB" dirty="0" err="1">
+              <a:t>int</a:t>
+            </a:r>
+          </a:p>
+          <a:p>
+            <a:r>
+              <a:rPr lang="en-GB" b="1" dirty="0">
+                <a:effectLst/>
+                <a:latin typeface="Arial" panose="020B0604020202020204" pitchFamily="34" charset="0"/>
+              </a:rPr>
+              <a:t>timestamp: </a:t>
+            </a:r>
+            <a:r>
+              <a:rPr lang="en-GB" b="1" dirty="0">
                 <a:solidFill>
-                  <a:srgbClr val="000000"/>
+                  <a:srgbClr val="0070C0"/>
                 </a:solidFill>
                 <a:effectLst/>
                 <a:latin typeface="Arial" panose="020B0604020202020204" pitchFamily="34" charset="0"/>
               </a:rPr>
-              <a:t>user_id</a:t>
-            </a:r>
-            <a:r>
-              <a:rPr lang="en-GB" dirty="0">
-                <a:solidFill>
-                  <a:srgbClr val="000000"/>
-                </a:solidFill>
-                <a:effectLst/>
-                <a:latin typeface="Arial" panose="020B0604020202020204" pitchFamily="34" charset="0"/>
-              </a:rPr>
-              <a:t>: int</a:t>
-            </a:r>
-          </a:p>
-          <a:p>
-            <a:r>
-              <a:rPr lang="en-GB" dirty="0">
-                <a:solidFill>
-                  <a:srgbClr val="000000"/>
-                </a:solidFill>
-                <a:effectLst/>
-                <a:latin typeface="Arial" panose="020B0604020202020204" pitchFamily="34" charset="0"/>
-              </a:rPr>
-              <a:t>timestamp: string</a:t>
+              <a:t>string</a:t>
+            </a:r>
+          </a:p>
+        </p:txBody>
+      </p:sp>
+      <p:sp>
+        <p:nvSpPr>
+          <p:cNvPr id="2" name="TextBox 1">
+            <a:extLst>
+              <a:ext uri="{FF2B5EF4-FFF2-40B4-BE49-F238E27FC236}">
+                <a16:creationId xmlns:a16="http://schemas.microsoft.com/office/drawing/2014/main" id="{BBE2167B-77DD-1EFD-3FD3-8885823B97A5}"/>
+              </a:ext>
+            </a:extLst>
+          </p:cNvPr>
+          <p:cNvSpPr txBox="1"/>
+          <p:nvPr/>
+        </p:nvSpPr>
+        <p:spPr>
+          <a:xfrm>
+            <a:off x="605481" y="259492"/>
+            <a:ext cx="5289205" cy="461665"/>
+          </a:xfrm>
+          <a:prstGeom prst="rect">
+            <a:avLst/>
+          </a:prstGeom>
+          <a:noFill/>
+        </p:spPr>
+        <p:txBody>
+          <a:bodyPr wrap="none" rtlCol="0">
+            <a:spAutoFit/>
+          </a:bodyPr>
+          <a:lstStyle/>
+          <a:p>
+            <a:r>
+              <a:rPr lang="en-GB" sz="2400" b="1" dirty="0"/>
+              <a:t>Database  Table Names and Schemas</a:t>
+            </a:r>
+          </a:p>
+        </p:txBody>
+      </p:sp>
+      <p:sp>
+        <p:nvSpPr>
+          <p:cNvPr id="4" name="TextBox 3">
+            <a:extLst>
+              <a:ext uri="{FF2B5EF4-FFF2-40B4-BE49-F238E27FC236}">
+                <a16:creationId xmlns:a16="http://schemas.microsoft.com/office/drawing/2014/main" id="{D5B9808D-32A7-F96B-EE27-26AE783917A8}"/>
+              </a:ext>
+            </a:extLst>
+          </p:cNvPr>
+          <p:cNvSpPr txBox="1"/>
+          <p:nvPr/>
+        </p:nvSpPr>
+        <p:spPr>
+          <a:xfrm>
+            <a:off x="6979349" y="2681416"/>
+            <a:ext cx="4747213" cy="923330"/>
+          </a:xfrm>
+          <a:prstGeom prst="rect">
+            <a:avLst/>
+          </a:prstGeom>
+          <a:noFill/>
+        </p:spPr>
+        <p:txBody>
+          <a:bodyPr wrap="square" rtlCol="0">
+            <a:spAutoFit/>
+          </a:bodyPr>
+          <a:lstStyle/>
+          <a:p>
+            <a:r>
+              <a:rPr lang="en-GB" dirty="0"/>
+              <a:t>The data types of the clicks table need to be aligned with the data types of the tables impressions and conversions (if the used</a:t>
             </a:r>
           </a:p>
         </p:txBody>
@@ -7271,7 +7610,185 @@
 </p:sld>
 </file>
 
-<file path=ppt/slides/slide3.xml><?xml version="1.0" encoding="utf-8"?>
+<file path=ppt/slides/slide5.xml><?xml version="1.0" encoding="utf-8"?>
+<p:sld xmlns:a="http://schemas.openxmlformats.org/drawingml/2006/main" xmlns:r="http://schemas.openxmlformats.org/officeDocument/2006/relationships" xmlns:p="http://schemas.openxmlformats.org/presentationml/2006/main" showMasterSp="0">
+  <p:cSld>
+    <p:bg>
+      <p:bgPr>
+        <a:gradFill>
+          <a:gsLst>
+            <a:gs pos="0">
+              <a:schemeClr val="accent1">
+                <a:lumMod val="5000"/>
+                <a:lumOff val="95000"/>
+              </a:schemeClr>
+            </a:gs>
+            <a:gs pos="74000">
+              <a:schemeClr val="accent1">
+                <a:lumMod val="45000"/>
+                <a:lumOff val="55000"/>
+              </a:schemeClr>
+            </a:gs>
+            <a:gs pos="83000">
+              <a:schemeClr val="accent1">
+                <a:lumMod val="45000"/>
+                <a:lumOff val="55000"/>
+              </a:schemeClr>
+            </a:gs>
+            <a:gs pos="100000">
+              <a:schemeClr val="accent1">
+                <a:lumMod val="30000"/>
+                <a:lumOff val="70000"/>
+              </a:schemeClr>
+            </a:gs>
+          </a:gsLst>
+          <a:lin ang="5400000" scaled="1"/>
+        </a:gradFill>
+        <a:effectLst/>
+      </p:bgPr>
+    </p:bg>
+    <p:spTree>
+      <p:nvGrpSpPr>
+        <p:cNvPr id="1" name=""/>
+        <p:cNvGrpSpPr/>
+        <p:nvPr/>
+      </p:nvGrpSpPr>
+      <p:grpSpPr>
+        <a:xfrm>
+          <a:off x="0" y="0"/>
+          <a:ext cx="0" cy="0"/>
+          <a:chOff x="0" y="0"/>
+          <a:chExt cx="0" cy="0"/>
+        </a:xfrm>
+      </p:grpSpPr>
+    </p:spTree>
+    <p:extLst>
+      <p:ext uri="{BB962C8B-B14F-4D97-AF65-F5344CB8AC3E}">
+        <p14:creationId xmlns:p14="http://schemas.microsoft.com/office/powerpoint/2010/main" val="2829524682"/>
+      </p:ext>
+    </p:extLst>
+  </p:cSld>
+  <p:clrMapOvr>
+    <a:masterClrMapping/>
+  </p:clrMapOvr>
+</p:sld>
+</file>
+
+<file path=ppt/slides/slide6.xml><?xml version="1.0" encoding="utf-8"?>
+<p:sld xmlns:a="http://schemas.openxmlformats.org/drawingml/2006/main" xmlns:r="http://schemas.openxmlformats.org/officeDocument/2006/relationships" xmlns:p="http://schemas.openxmlformats.org/presentationml/2006/main" showMasterSp="0">
+  <p:cSld>
+    <p:bg>
+      <p:bgPr>
+        <a:gradFill>
+          <a:gsLst>
+            <a:gs pos="0">
+              <a:schemeClr val="accent1">
+                <a:lumMod val="5000"/>
+                <a:lumOff val="95000"/>
+              </a:schemeClr>
+            </a:gs>
+            <a:gs pos="74000">
+              <a:schemeClr val="accent1">
+                <a:lumMod val="45000"/>
+                <a:lumOff val="55000"/>
+              </a:schemeClr>
+            </a:gs>
+            <a:gs pos="83000">
+              <a:schemeClr val="accent1">
+                <a:lumMod val="45000"/>
+                <a:lumOff val="55000"/>
+              </a:schemeClr>
+            </a:gs>
+            <a:gs pos="100000">
+              <a:schemeClr val="accent1">
+                <a:lumMod val="30000"/>
+                <a:lumOff val="70000"/>
+              </a:schemeClr>
+            </a:gs>
+          </a:gsLst>
+          <a:lin ang="5400000" scaled="1"/>
+        </a:gradFill>
+        <a:effectLst/>
+      </p:bgPr>
+    </p:bg>
+    <p:spTree>
+      <p:nvGrpSpPr>
+        <p:cNvPr id="1" name=""/>
+        <p:cNvGrpSpPr/>
+        <p:nvPr/>
+      </p:nvGrpSpPr>
+      <p:grpSpPr>
+        <a:xfrm>
+          <a:off x="0" y="0"/>
+          <a:ext cx="0" cy="0"/>
+          <a:chOff x="0" y="0"/>
+          <a:chExt cx="0" cy="0"/>
+        </a:xfrm>
+      </p:grpSpPr>
+      <p:sp>
+        <p:nvSpPr>
+          <p:cNvPr id="2" name="Title 1">
+            <a:extLst>
+              <a:ext uri="{FF2B5EF4-FFF2-40B4-BE49-F238E27FC236}">
+                <a16:creationId xmlns:a16="http://schemas.microsoft.com/office/drawing/2014/main" id="{E711B6D7-F9D4-702C-CD8B-722662145FE6}"/>
+              </a:ext>
+            </a:extLst>
+          </p:cNvPr>
+          <p:cNvSpPr>
+            <a:spLocks noGrp="1"/>
+          </p:cNvSpPr>
+          <p:nvPr>
+            <p:ph type="title"/>
+          </p:nvPr>
+        </p:nvSpPr>
+        <p:spPr/>
+        <p:txBody>
+          <a:bodyPr/>
+          <a:lstStyle/>
+          <a:p>
+            <a:endParaRPr lang="en-GB"/>
+          </a:p>
+        </p:txBody>
+      </p:sp>
+      <p:sp>
+        <p:nvSpPr>
+          <p:cNvPr id="3" name="Content Placeholder 2">
+            <a:extLst>
+              <a:ext uri="{FF2B5EF4-FFF2-40B4-BE49-F238E27FC236}">
+                <a16:creationId xmlns:a16="http://schemas.microsoft.com/office/drawing/2014/main" id="{1F1B9D29-9E73-A5E4-F0D8-8608D0521CAB}"/>
+              </a:ext>
+            </a:extLst>
+          </p:cNvPr>
+          <p:cNvSpPr>
+            <a:spLocks noGrp="1"/>
+          </p:cNvSpPr>
+          <p:nvPr>
+            <p:ph idx="1"/>
+          </p:nvPr>
+        </p:nvSpPr>
+        <p:spPr/>
+        <p:txBody>
+          <a:bodyPr/>
+          <a:lstStyle/>
+          <a:p>
+            <a:endParaRPr lang="en-GB"/>
+          </a:p>
+        </p:txBody>
+      </p:sp>
+    </p:spTree>
+    <p:extLst>
+      <p:ext uri="{BB962C8B-B14F-4D97-AF65-F5344CB8AC3E}">
+        <p14:creationId xmlns:p14="http://schemas.microsoft.com/office/powerpoint/2010/main" val="3810086290"/>
+      </p:ext>
+    </p:extLst>
+  </p:cSld>
+  <p:clrMapOvr>
+    <a:masterClrMapping/>
+  </p:clrMapOvr>
+</p:sld>
+</file>
+
+<file path=ppt/slides/slide7.xml><?xml version="1.0" encoding="utf-8"?>
 <p:sld xmlns:a="http://schemas.openxmlformats.org/drawingml/2006/main" xmlns:r="http://schemas.openxmlformats.org/officeDocument/2006/relationships" xmlns:p="http://schemas.openxmlformats.org/presentationml/2006/main" showMasterSp="0">
   <p:cSld>
     <p:spTree>

</xml_diff>